<commit_message>
further updates with ppt
</commit_message>
<xml_diff>
--- a/covid-policy-responses.pptx
+++ b/covid-policy-responses.pptx
@@ -5,7 +5,7 @@
     <p:sldMasterId id="2147483926" r:id="rId1"/>
   </p:sldMasterIdLst>
   <p:notesMasterIdLst>
-    <p:notesMasterId r:id="rId15"/>
+    <p:notesMasterId r:id="rId17"/>
   </p:notesMasterIdLst>
   <p:sldIdLst>
     <p:sldId id="256" r:id="rId2"/>
@@ -19,8 +19,10 @@
     <p:sldId id="265" r:id="rId10"/>
     <p:sldId id="268" r:id="rId11"/>
     <p:sldId id="263" r:id="rId12"/>
-    <p:sldId id="267" r:id="rId13"/>
-    <p:sldId id="262" r:id="rId14"/>
+    <p:sldId id="269" r:id="rId13"/>
+    <p:sldId id="267" r:id="rId14"/>
+    <p:sldId id="270" r:id="rId15"/>
+    <p:sldId id="262" r:id="rId16"/>
   </p:sldIdLst>
   <p:sldSz cx="12192000" cy="6858000"/>
   <p:notesSz cx="6858000" cy="9144000"/>
@@ -888,6 +890,90 @@
     <p:extLst>
       <p:ext uri="{BB962C8B-B14F-4D97-AF65-F5344CB8AC3E}">
         <p14:creationId xmlns:p14="http://schemas.microsoft.com/office/powerpoint/2010/main" val="1619887788"/>
+      </p:ext>
+    </p:extLst>
+  </p:cSld>
+  <p:clrMapOvr>
+    <a:masterClrMapping/>
+  </p:clrMapOvr>
+</p:notes>
+</file>
+
+<file path=ppt/notesSlides/notesSlide6.xml><?xml version="1.0" encoding="utf-8"?>
+<p:notes xmlns:a="http://schemas.openxmlformats.org/drawingml/2006/main" xmlns:r="http://schemas.openxmlformats.org/officeDocument/2006/relationships" xmlns:p="http://schemas.openxmlformats.org/presentationml/2006/main">
+  <p:cSld>
+    <p:spTree>
+      <p:nvGrpSpPr>
+        <p:cNvPr id="1" name=""/>
+        <p:cNvGrpSpPr/>
+        <p:nvPr/>
+      </p:nvGrpSpPr>
+      <p:grpSpPr>
+        <a:xfrm>
+          <a:off x="0" y="0"/>
+          <a:ext cx="0" cy="0"/>
+          <a:chOff x="0" y="0"/>
+          <a:chExt cx="0" cy="0"/>
+        </a:xfrm>
+      </p:grpSpPr>
+      <p:sp>
+        <p:nvSpPr>
+          <p:cNvPr id="2" name="Slide Image Placeholder 1"/>
+          <p:cNvSpPr>
+            <a:spLocks noGrp="1" noRot="1" noChangeAspect="1"/>
+          </p:cNvSpPr>
+          <p:nvPr>
+            <p:ph type="sldImg"/>
+          </p:nvPr>
+        </p:nvSpPr>
+        <p:spPr/>
+      </p:sp>
+      <p:sp>
+        <p:nvSpPr>
+          <p:cNvPr id="3" name="Notes Placeholder 2"/>
+          <p:cNvSpPr>
+            <a:spLocks noGrp="1"/>
+          </p:cNvSpPr>
+          <p:nvPr>
+            <p:ph type="body" idx="1"/>
+          </p:nvPr>
+        </p:nvSpPr>
+        <p:spPr/>
+        <p:txBody>
+          <a:bodyPr/>
+          <a:lstStyle/>
+          <a:p>
+            <a:endParaRPr lang="en-US" dirty="0"/>
+          </a:p>
+        </p:txBody>
+      </p:sp>
+      <p:sp>
+        <p:nvSpPr>
+          <p:cNvPr id="4" name="Slide Number Placeholder 3"/>
+          <p:cNvSpPr>
+            <a:spLocks noGrp="1"/>
+          </p:cNvSpPr>
+          <p:nvPr>
+            <p:ph type="sldNum" sz="quarter" idx="5"/>
+          </p:nvPr>
+        </p:nvSpPr>
+        <p:spPr/>
+        <p:txBody>
+          <a:bodyPr/>
+          <a:lstStyle/>
+          <a:p>
+            <a:fld id="{D92BE48F-ED33-F34E-B68D-0C16E5B92558}" type="slidenum">
+              <a:rPr lang="en-US" smtClean="0"/>
+              <a:t>12</a:t>
+            </a:fld>
+            <a:endParaRPr lang="en-US"/>
+          </a:p>
+        </p:txBody>
+      </p:sp>
+    </p:spTree>
+    <p:extLst>
+      <p:ext uri="{BB962C8B-B14F-4D97-AF65-F5344CB8AC3E}">
+        <p14:creationId xmlns:p14="http://schemas.microsoft.com/office/powerpoint/2010/main" val="2530664277"/>
       </p:ext>
     </p:extLst>
   </p:cSld>
@@ -7350,6 +7436,28 @@
 <file path=ppt/slides/slide10.xml><?xml version="1.0" encoding="utf-8"?>
 <p:sld xmlns:a="http://schemas.openxmlformats.org/drawingml/2006/main" xmlns:r="http://schemas.openxmlformats.org/officeDocument/2006/relationships" xmlns:p="http://schemas.openxmlformats.org/presentationml/2006/main">
   <p:cSld>
+    <p:bg>
+      <p:bgPr>
+        <a:gradFill rotWithShape="1">
+          <a:gsLst>
+            <a:gs pos="0">
+              <a:schemeClr val="bg1">
+                <a:tint val="90000"/>
+                <a:lumMod val="110000"/>
+              </a:schemeClr>
+            </a:gs>
+            <a:gs pos="100000">
+              <a:schemeClr val="bg1">
+                <a:shade val="64000"/>
+                <a:lumMod val="88000"/>
+              </a:schemeClr>
+            </a:gs>
+          </a:gsLst>
+          <a:lin ang="5400000" scaled="0"/>
+        </a:gradFill>
+        <a:effectLst/>
+      </p:bgPr>
+    </p:bg>
     <p:spTree>
       <p:nvGrpSpPr>
         <p:cNvPr id="1" name=""/>
@@ -7364,6 +7472,162 @@
           <a:chExt cx="0" cy="0"/>
         </a:xfrm>
       </p:grpSpPr>
+      <p:sp useBgFill="1">
+        <p:nvSpPr>
+          <p:cNvPr id="16" name="Rectangle 9">
+            <a:extLst>
+              <a:ext uri="{FF2B5EF4-FFF2-40B4-BE49-F238E27FC236}">
+                <a16:creationId xmlns:a16="http://schemas.microsoft.com/office/drawing/2014/main" id="{48FE65CB-EFD8-497D-A30A-093E20EACB05}"/>
+              </a:ext>
+              <a:ext uri="{C183D7F6-B498-43B3-948B-1728B52AA6E4}">
+                <adec:decorative xmlns:adec="http://schemas.microsoft.com/office/drawing/2017/decorative" val="1"/>
+              </a:ext>
+            </a:extLst>
+          </p:cNvPr>
+          <p:cNvSpPr>
+            <a:spLocks noGrp="1" noRot="1" noChangeAspect="1" noMove="1" noResize="1" noEditPoints="1" noAdjustHandles="1" noChangeArrowheads="1" noChangeShapeType="1" noTextEdit="1"/>
+          </p:cNvSpPr>
+          <p:nvPr>
+            <p:extLst>
+              <p:ext uri="{386F3935-93C4-4BCD-93E2-E3B085C9AB24}">
+                <p16:designElem xmlns:p16="http://schemas.microsoft.com/office/powerpoint/2015/main" val="1"/>
+              </p:ext>
+            </p:extLst>
+          </p:nvPr>
+        </p:nvSpPr>
+        <p:spPr>
+          <a:xfrm>
+            <a:off x="0" y="0"/>
+            <a:ext cx="12192000" cy="6858000"/>
+          </a:xfrm>
+          <a:prstGeom prst="rect">
+            <a:avLst/>
+          </a:prstGeom>
+          <a:ln>
+            <a:noFill/>
+          </a:ln>
+        </p:spPr>
+        <p:style>
+          <a:lnRef idx="2">
+            <a:schemeClr val="accent1">
+              <a:shade val="50000"/>
+            </a:schemeClr>
+          </a:lnRef>
+          <a:fillRef idx="1">
+            <a:schemeClr val="accent1"/>
+          </a:fillRef>
+          <a:effectRef idx="0">
+            <a:schemeClr val="accent1"/>
+          </a:effectRef>
+          <a:fontRef idx="minor">
+            <a:schemeClr val="lt1"/>
+          </a:fontRef>
+        </p:style>
+        <p:txBody>
+          <a:bodyPr rtlCol="0" anchor="ctr"/>
+          <a:lstStyle/>
+          <a:p>
+            <a:pPr algn="ctr"/>
+            <a:endParaRPr lang="en-US"/>
+          </a:p>
+        </p:txBody>
+      </p:sp>
+      <p:pic>
+        <p:nvPicPr>
+          <p:cNvPr id="5" name="Picture 4">
+            <a:extLst>
+              <a:ext uri="{FF2B5EF4-FFF2-40B4-BE49-F238E27FC236}">
+                <a16:creationId xmlns:a16="http://schemas.microsoft.com/office/drawing/2014/main" id="{3F6EEA71-F030-6840-A129-CD847A0EE8C4}"/>
+              </a:ext>
+            </a:extLst>
+          </p:cNvPr>
+          <p:cNvPicPr>
+            <a:picLocks noChangeAspect="1"/>
+          </p:cNvPicPr>
+          <p:nvPr/>
+        </p:nvPicPr>
+        <p:blipFill>
+          <a:blip r:embed="rId2"/>
+          <a:stretch>
+            <a:fillRect/>
+          </a:stretch>
+        </p:blipFill>
+        <p:spPr>
+          <a:xfrm>
+            <a:off x="948265" y="1636324"/>
+            <a:ext cx="6909479" cy="4612077"/>
+          </a:xfrm>
+          <a:prstGeom prst="roundRect">
+            <a:avLst>
+              <a:gd name="adj" fmla="val 2981"/>
+            </a:avLst>
+          </a:prstGeom>
+          <a:ln w="82550" cap="sq">
+            <a:solidFill>
+              <a:srgbClr val="EAEAEA"/>
+            </a:solidFill>
+            <a:miter lim="800000"/>
+          </a:ln>
+          <a:effectLst/>
+          <a:scene3d>
+            <a:camera prst="orthographicFront"/>
+            <a:lightRig rig="threePt" dir="t">
+              <a:rot lat="0" lon="0" rev="2700000"/>
+            </a:lightRig>
+          </a:scene3d>
+          <a:sp3d contourW="6350">
+            <a:bevelT h="38100"/>
+            <a:contourClr>
+              <a:srgbClr val="C0C0C0"/>
+            </a:contourClr>
+          </a:sp3d>
+        </p:spPr>
+      </p:pic>
+      <p:pic>
+        <p:nvPicPr>
+          <p:cNvPr id="17" name="Picture 11">
+            <a:extLst>
+              <a:ext uri="{FF2B5EF4-FFF2-40B4-BE49-F238E27FC236}">
+                <a16:creationId xmlns:a16="http://schemas.microsoft.com/office/drawing/2014/main" id="{E3265C2A-0A58-43AD-A406-8F4478E28758}"/>
+              </a:ext>
+              <a:ext uri="{C183D7F6-B498-43B3-948B-1728B52AA6E4}">
+                <adec:decorative xmlns:adec="http://schemas.microsoft.com/office/drawing/2017/decorative" val="1"/>
+              </a:ext>
+            </a:extLst>
+          </p:cNvPr>
+          <p:cNvPicPr>
+            <a:picLocks noGrp="1" noRot="1" noChangeAspect="1" noMove="1" noResize="1" noEditPoints="1" noAdjustHandles="1" noChangeArrowheads="1" noChangeShapeType="1" noCrop="1"/>
+          </p:cNvPicPr>
+          <p:nvPr>
+            <p:extLst>
+              <p:ext uri="{386F3935-93C4-4BCD-93E2-E3B085C9AB24}">
+                <p16:designElem xmlns:p16="http://schemas.microsoft.com/office/powerpoint/2015/main" val="1"/>
+              </p:ext>
+            </p:extLst>
+          </p:nvPr>
+        </p:nvPicPr>
+        <p:blipFill>
+          <a:blip r:embed="rId3">
+            <a:extLst>
+              <a:ext uri="{28A0092B-C50C-407E-A947-70E740481C1C}">
+                <a14:useLocalDpi xmlns:a14="http://schemas.microsoft.com/office/drawing/2010/main" val="0"/>
+              </a:ext>
+            </a:extLst>
+          </a:blip>
+          <a:stretch>
+            <a:fillRect/>
+          </a:stretch>
+        </p:blipFill>
+        <p:spPr>
+          <a:xfrm>
+            <a:off x="0" y="0"/>
+            <a:ext cx="12192000" cy="6858000"/>
+          </a:xfrm>
+          <a:prstGeom prst="rect">
+            <a:avLst/>
+          </a:prstGeom>
+        </p:spPr>
+      </p:pic>
       <p:sp>
         <p:nvSpPr>
           <p:cNvPr id="2" name="Title 1">
@@ -7380,12 +7644,22 @@
             <p:ph type="title"/>
           </p:nvPr>
         </p:nvSpPr>
-        <p:spPr/>
-        <p:txBody>
-          <a:bodyPr/>
-          <a:lstStyle/>
-          <a:p>
-            <a:endParaRPr lang="en-US"/>
+        <p:spPr>
+          <a:xfrm>
+            <a:off x="1360823" y="239793"/>
+            <a:ext cx="9470354" cy="1573863"/>
+          </a:xfrm>
+        </p:spPr>
+        <p:txBody>
+          <a:bodyPr>
+            <a:normAutofit/>
+          </a:bodyPr>
+          <a:lstStyle/>
+          <a:p>
+            <a:r>
+              <a:rPr lang="en-US" dirty="0"/>
+              <a:t>Overall International travel Control</a:t>
+            </a:r>
           </a:p>
         </p:txBody>
       </p:sp>
@@ -7405,12 +7679,23 @@
             <p:ph idx="1"/>
           </p:nvPr>
         </p:nvSpPr>
-        <p:spPr/>
-        <p:txBody>
-          <a:bodyPr/>
-          <a:lstStyle/>
-          <a:p>
-            <a:endParaRPr lang="en-US"/>
+        <p:spPr>
+          <a:xfrm>
+            <a:off x="8196408" y="1813656"/>
+            <a:ext cx="3352128" cy="4434745"/>
+          </a:xfrm>
+        </p:spPr>
+        <p:txBody>
+          <a:bodyPr>
+            <a:normAutofit/>
+          </a:bodyPr>
+          <a:lstStyle/>
+          <a:p>
+            <a:r>
+              <a:rPr lang="en-AU" dirty="0"/>
+              <a:t>the restriction is not clearly indicating a decrease in the number of new cases, though the effort each government make may ease the number. The relationship between them is not corresponding each other.</a:t>
+            </a:r>
+            <a:endParaRPr lang="en-US" sz="1800" dirty="0"/>
           </a:p>
         </p:txBody>
       </p:sp>
@@ -7512,7 +7797,7 @@
         </p:blipFill>
         <p:spPr>
           <a:xfrm>
-            <a:off x="2885778" y="2366963"/>
+            <a:off x="5433035" y="2502153"/>
             <a:ext cx="6420444" cy="3424237"/>
           </a:xfrm>
           <a:prstGeom prst="rect">
@@ -7585,6 +7870,541 @@
           <p:cNvPr id="2" name="Title 1">
             <a:extLst>
               <a:ext uri="{FF2B5EF4-FFF2-40B4-BE49-F238E27FC236}">
+                <a16:creationId xmlns:a16="http://schemas.microsoft.com/office/drawing/2014/main" id="{46EC5FE2-2705-F44E-BEE0-51E15D5AE1F1}"/>
+              </a:ext>
+            </a:extLst>
+          </p:cNvPr>
+          <p:cNvSpPr>
+            <a:spLocks noGrp="1"/>
+          </p:cNvSpPr>
+          <p:nvPr>
+            <p:ph type="title"/>
+          </p:nvPr>
+        </p:nvSpPr>
+        <p:spPr>
+          <a:xfrm>
+            <a:off x="913776" y="651174"/>
+            <a:ext cx="10364451" cy="1596177"/>
+          </a:xfrm>
+        </p:spPr>
+        <p:txBody>
+          <a:bodyPr/>
+          <a:lstStyle/>
+          <a:p>
+            <a:r>
+              <a:rPr lang="en-US" dirty="0"/>
+              <a:t>Income Support effects on Covid spread</a:t>
+            </a:r>
+          </a:p>
+        </p:txBody>
+      </p:sp>
+      <p:sp>
+        <p:nvSpPr>
+          <p:cNvPr id="3" name="Content Placeholder 2">
+            <a:extLst>
+              <a:ext uri="{FF2B5EF4-FFF2-40B4-BE49-F238E27FC236}">
+                <a16:creationId xmlns:a16="http://schemas.microsoft.com/office/drawing/2014/main" id="{DE3C267C-9149-B943-AF69-05B1D8F06C6F}"/>
+              </a:ext>
+            </a:extLst>
+          </p:cNvPr>
+          <p:cNvSpPr>
+            <a:spLocks noGrp="1"/>
+          </p:cNvSpPr>
+          <p:nvPr>
+            <p:ph idx="1"/>
+          </p:nvPr>
+        </p:nvSpPr>
+        <p:spPr>
+          <a:xfrm>
+            <a:off x="913776" y="2709994"/>
+            <a:ext cx="10364452" cy="2564136"/>
+          </a:xfrm>
+        </p:spPr>
+        <p:txBody>
+          <a:bodyPr/>
+          <a:lstStyle/>
+          <a:p>
+            <a:r>
+              <a:rPr lang="en-US" dirty="0"/>
+              <a:t>With the data given we can’t be sure that income support has positive effect on controlling covid spread.</a:t>
+            </a:r>
+          </a:p>
+          <a:p>
+            <a:r>
+              <a:rPr lang="en-US" dirty="0"/>
+              <a:t>In conjunction with face covering and travel restriction we could see the control on covid spread but this can’t be directly connected to income support</a:t>
+            </a:r>
+          </a:p>
+        </p:txBody>
+      </p:sp>
+    </p:spTree>
+    <p:extLst>
+      <p:ext uri="{BB962C8B-B14F-4D97-AF65-F5344CB8AC3E}">
+        <p14:creationId xmlns:p14="http://schemas.microsoft.com/office/powerpoint/2010/main" val="1800825613"/>
+      </p:ext>
+    </p:extLst>
+  </p:cSld>
+  <p:clrMapOvr>
+    <a:masterClrMapping/>
+  </p:clrMapOvr>
+</p:sld>
+</file>
+
+<file path=ppt/slides/slide13.xml><?xml version="1.0" encoding="utf-8"?>
+<p:sld xmlns:a="http://schemas.openxmlformats.org/drawingml/2006/main" xmlns:r="http://schemas.openxmlformats.org/officeDocument/2006/relationships" xmlns:p="http://schemas.openxmlformats.org/presentationml/2006/main">
+  <p:cSld>
+    <p:bg>
+      <p:bgPr>
+        <a:gradFill rotWithShape="1">
+          <a:gsLst>
+            <a:gs pos="0">
+              <a:schemeClr val="bg1">
+                <a:tint val="90000"/>
+                <a:lumMod val="110000"/>
+              </a:schemeClr>
+            </a:gs>
+            <a:gs pos="100000">
+              <a:schemeClr val="bg1">
+                <a:shade val="64000"/>
+                <a:lumMod val="88000"/>
+              </a:schemeClr>
+            </a:gs>
+          </a:gsLst>
+          <a:lin ang="5400000" scaled="0"/>
+        </a:gradFill>
+        <a:effectLst/>
+      </p:bgPr>
+    </p:bg>
+    <p:spTree>
+      <p:nvGrpSpPr>
+        <p:cNvPr id="1" name=""/>
+        <p:cNvGrpSpPr/>
+        <p:nvPr/>
+      </p:nvGrpSpPr>
+      <p:grpSpPr>
+        <a:xfrm>
+          <a:off x="0" y="0"/>
+          <a:ext cx="0" cy="0"/>
+          <a:chOff x="0" y="0"/>
+          <a:chExt cx="0" cy="0"/>
+        </a:xfrm>
+      </p:grpSpPr>
+      <p:pic>
+        <p:nvPicPr>
+          <p:cNvPr id="35" name="Picture 2">
+            <a:extLst>
+              <a:ext uri="{FF2B5EF4-FFF2-40B4-BE49-F238E27FC236}">
+                <a16:creationId xmlns:a16="http://schemas.microsoft.com/office/drawing/2014/main" id="{E1408BAF-1350-4BC5-9C72-82A08BB07B46}"/>
+              </a:ext>
+              <a:ext uri="{C183D7F6-B498-43B3-948B-1728B52AA6E4}">
+                <adec:decorative xmlns:adec="http://schemas.microsoft.com/office/drawing/2017/decorative" val="1"/>
+              </a:ext>
+            </a:extLst>
+          </p:cNvPr>
+          <p:cNvPicPr>
+            <a:picLocks noGrp="1" noRot="1" noChangeAspect="1" noMove="1" noResize="1" noEditPoints="1" noAdjustHandles="1" noChangeArrowheads="1" noChangeShapeType="1" noCrop="1"/>
+          </p:cNvPicPr>
+          <p:nvPr>
+            <p:extLst>
+              <p:ext uri="{386F3935-93C4-4BCD-93E2-E3B085C9AB24}">
+                <p16:designElem xmlns:p16="http://schemas.microsoft.com/office/powerpoint/2015/main" val="1"/>
+              </p:ext>
+            </p:extLst>
+          </p:nvPr>
+        </p:nvPicPr>
+        <p:blipFill>
+          <a:blip r:embed="rId2">
+            <a:alphaModFix/>
+            <a:extLst>
+              <a:ext uri="{28A0092B-C50C-407E-A947-70E740481C1C}">
+                <a14:useLocalDpi xmlns:a14="http://schemas.microsoft.com/office/drawing/2010/main" val="0"/>
+              </a:ext>
+            </a:extLst>
+          </a:blip>
+          <a:srcRect/>
+          <a:stretch>
+            <a:fillRect/>
+          </a:stretch>
+        </p:blipFill>
+        <p:spPr bwMode="auto">
+          <a:xfrm>
+            <a:off x="0" y="-1"/>
+            <a:ext cx="12192003" cy="6858001"/>
+          </a:xfrm>
+          <a:prstGeom prst="rect">
+            <a:avLst/>
+          </a:prstGeom>
+          <a:noFill/>
+          <a:extLst>
+            <a:ext uri="{909E8E84-426E-40DD-AFC4-6F175D3DCCD1}">
+              <a14:hiddenFill xmlns:a14="http://schemas.microsoft.com/office/drawing/2010/main">
+                <a:solidFill>
+                  <a:srgbClr val="FFFFFF"/>
+                </a:solidFill>
+              </a14:hiddenFill>
+            </a:ext>
+          </a:extLst>
+        </p:spPr>
+      </p:pic>
+      <p:pic>
+        <p:nvPicPr>
+          <p:cNvPr id="37" name="Picture 36">
+            <a:extLst>
+              <a:ext uri="{FF2B5EF4-FFF2-40B4-BE49-F238E27FC236}">
+                <a16:creationId xmlns:a16="http://schemas.microsoft.com/office/drawing/2014/main" id="{60E67B53-E530-4CC6-B1E7-4CCC1FD6323F}"/>
+              </a:ext>
+              <a:ext uri="{C183D7F6-B498-43B3-948B-1728B52AA6E4}">
+                <adec:decorative xmlns:adec="http://schemas.microsoft.com/office/drawing/2017/decorative" val="1"/>
+              </a:ext>
+            </a:extLst>
+          </p:cNvPr>
+          <p:cNvPicPr>
+            <a:picLocks noGrp="1" noRot="1" noChangeAspect="1" noMove="1" noResize="1" noEditPoints="1" noAdjustHandles="1" noChangeArrowheads="1" noChangeShapeType="1" noCrop="1"/>
+          </p:cNvPicPr>
+          <p:nvPr>
+            <p:extLst>
+              <p:ext uri="{386F3935-93C4-4BCD-93E2-E3B085C9AB24}">
+                <p16:designElem xmlns:p16="http://schemas.microsoft.com/office/powerpoint/2015/main" val="1"/>
+              </p:ext>
+            </p:extLst>
+          </p:nvPr>
+        </p:nvPicPr>
+        <p:blipFill>
+          <a:blip r:embed="rId3">
+            <a:extLst>
+              <a:ext uri="{28A0092B-C50C-407E-A947-70E740481C1C}">
+                <a14:useLocalDpi xmlns:a14="http://schemas.microsoft.com/office/drawing/2010/main" val="0"/>
+              </a:ext>
+            </a:extLst>
+          </a:blip>
+          <a:stretch>
+            <a:fillRect/>
+          </a:stretch>
+        </p:blipFill>
+        <p:spPr>
+          <a:xfrm>
+            <a:off x="0" y="0"/>
+            <a:ext cx="12192000" cy="6858000"/>
+          </a:xfrm>
+          <a:prstGeom prst="rect">
+            <a:avLst/>
+          </a:prstGeom>
+        </p:spPr>
+      </p:pic>
+      <p:sp useBgFill="1">
+        <p:nvSpPr>
+          <p:cNvPr id="39" name="Rectangle 38">
+            <a:extLst>
+              <a:ext uri="{FF2B5EF4-FFF2-40B4-BE49-F238E27FC236}">
+                <a16:creationId xmlns:a16="http://schemas.microsoft.com/office/drawing/2014/main" id="{AE94ADDC-FBCA-4838-8D97-4B0770AFC1FC}"/>
+              </a:ext>
+              <a:ext uri="{C183D7F6-B498-43B3-948B-1728B52AA6E4}">
+                <adec:decorative xmlns:adec="http://schemas.microsoft.com/office/drawing/2017/decorative" val="1"/>
+              </a:ext>
+            </a:extLst>
+          </p:cNvPr>
+          <p:cNvSpPr>
+            <a:spLocks noGrp="1" noRot="1" noChangeAspect="1" noMove="1" noResize="1" noEditPoints="1" noAdjustHandles="1" noChangeArrowheads="1" noChangeShapeType="1" noTextEdit="1"/>
+          </p:cNvSpPr>
+          <p:nvPr>
+            <p:extLst>
+              <p:ext uri="{386F3935-93C4-4BCD-93E2-E3B085C9AB24}">
+                <p16:designElem xmlns:p16="http://schemas.microsoft.com/office/powerpoint/2015/main" val="1"/>
+              </p:ext>
+            </p:extLst>
+          </p:nvPr>
+        </p:nvSpPr>
+        <p:spPr>
+          <a:xfrm>
+            <a:off x="0" y="0"/>
+            <a:ext cx="12192000" cy="6858000"/>
+          </a:xfrm>
+          <a:prstGeom prst="rect">
+            <a:avLst/>
+          </a:prstGeom>
+          <a:ln>
+            <a:noFill/>
+          </a:ln>
+        </p:spPr>
+        <p:style>
+          <a:lnRef idx="2">
+            <a:schemeClr val="accent1">
+              <a:shade val="50000"/>
+            </a:schemeClr>
+          </a:lnRef>
+          <a:fillRef idx="1">
+            <a:schemeClr val="accent1"/>
+          </a:fillRef>
+          <a:effectRef idx="0">
+            <a:schemeClr val="accent1"/>
+          </a:effectRef>
+          <a:fontRef idx="minor">
+            <a:schemeClr val="lt1"/>
+          </a:fontRef>
+        </p:style>
+        <p:txBody>
+          <a:bodyPr rtlCol="0" anchor="ctr"/>
+          <a:lstStyle/>
+          <a:p>
+            <a:pPr algn="ctr"/>
+            <a:endParaRPr lang="en-US"/>
+          </a:p>
+        </p:txBody>
+      </p:sp>
+      <p:pic>
+        <p:nvPicPr>
+          <p:cNvPr id="41" name="Picture 2">
+            <a:extLst>
+              <a:ext uri="{FF2B5EF4-FFF2-40B4-BE49-F238E27FC236}">
+                <a16:creationId xmlns:a16="http://schemas.microsoft.com/office/drawing/2014/main" id="{EDB06F6B-6027-4B19-829E-EEDE917268FE}"/>
+              </a:ext>
+              <a:ext uri="{C183D7F6-B498-43B3-948B-1728B52AA6E4}">
+                <adec:decorative xmlns:adec="http://schemas.microsoft.com/office/drawing/2017/decorative" val="1"/>
+              </a:ext>
+            </a:extLst>
+          </p:cNvPr>
+          <p:cNvPicPr>
+            <a:picLocks noGrp="1" noRot="1" noChangeAspect="1" noMove="1" noResize="1" noEditPoints="1" noAdjustHandles="1" noChangeArrowheads="1" noChangeShapeType="1" noCrop="1"/>
+          </p:cNvPicPr>
+          <p:nvPr>
+            <p:extLst>
+              <p:ext uri="{386F3935-93C4-4BCD-93E2-E3B085C9AB24}">
+                <p16:designElem xmlns:p16="http://schemas.microsoft.com/office/powerpoint/2015/main" val="1"/>
+              </p:ext>
+            </p:extLst>
+          </p:nvPr>
+        </p:nvPicPr>
+        <p:blipFill>
+          <a:blip r:embed="rId2">
+            <a:alphaModFix amt="70000"/>
+            <a:extLst>
+              <a:ext uri="{28A0092B-C50C-407E-A947-70E740481C1C}">
+                <a14:useLocalDpi xmlns:a14="http://schemas.microsoft.com/office/drawing/2010/main" val="0"/>
+              </a:ext>
+            </a:extLst>
+          </a:blip>
+          <a:srcRect/>
+          <a:stretch>
+            <a:fillRect/>
+          </a:stretch>
+        </p:blipFill>
+        <p:spPr bwMode="auto">
+          <a:xfrm>
+            <a:off x="0" y="-1"/>
+            <a:ext cx="12192003" cy="6858001"/>
+          </a:xfrm>
+          <a:prstGeom prst="rect">
+            <a:avLst/>
+          </a:prstGeom>
+          <a:noFill/>
+          <a:extLst>
+            <a:ext uri="{909E8E84-426E-40DD-AFC4-6F175D3DCCD1}">
+              <a14:hiddenFill xmlns:a14="http://schemas.microsoft.com/office/drawing/2010/main">
+                <a:solidFill>
+                  <a:srgbClr val="FFFFFF"/>
+                </a:solidFill>
+              </a14:hiddenFill>
+            </a:ext>
+          </a:extLst>
+        </p:spPr>
+      </p:pic>
+      <p:pic>
+        <p:nvPicPr>
+          <p:cNvPr id="7" name="Picture 6" descr="Chart, line chart&#10;&#10;Description automatically generated">
+            <a:extLst>
+              <a:ext uri="{FF2B5EF4-FFF2-40B4-BE49-F238E27FC236}">
+                <a16:creationId xmlns:a16="http://schemas.microsoft.com/office/drawing/2014/main" id="{AC9A3920-D7F1-5E49-9BB2-87B95BD48E9E}"/>
+              </a:ext>
+            </a:extLst>
+          </p:cNvPr>
+          <p:cNvPicPr>
+            <a:picLocks noChangeAspect="1"/>
+          </p:cNvPicPr>
+          <p:nvPr/>
+        </p:nvPicPr>
+        <p:blipFill>
+          <a:blip r:embed="rId4"/>
+          <a:stretch>
+            <a:fillRect/>
+          </a:stretch>
+        </p:blipFill>
+        <p:spPr>
+          <a:xfrm>
+            <a:off x="872749" y="1659613"/>
+            <a:ext cx="4921842" cy="4398285"/>
+          </a:xfrm>
+          <a:prstGeom prst="roundRect">
+            <a:avLst>
+              <a:gd name="adj" fmla="val 5301"/>
+            </a:avLst>
+          </a:prstGeom>
+          <a:ln w="82550" cap="sq">
+            <a:solidFill>
+              <a:srgbClr val="EAEAEA"/>
+            </a:solidFill>
+            <a:miter lim="800000"/>
+          </a:ln>
+          <a:effectLst/>
+          <a:scene3d>
+            <a:camera prst="orthographicFront"/>
+            <a:lightRig rig="threePt" dir="t">
+              <a:rot lat="0" lon="0" rev="2700000"/>
+            </a:lightRig>
+          </a:scene3d>
+          <a:sp3d contourW="6350">
+            <a:bevelT h="38100"/>
+            <a:contourClr>
+              <a:srgbClr val="C0C0C0"/>
+            </a:contourClr>
+          </a:sp3d>
+        </p:spPr>
+      </p:pic>
+      <p:pic>
+        <p:nvPicPr>
+          <p:cNvPr id="5" name="Content Placeholder 4" descr="Chart, line chart&#10;&#10;Description automatically generated">
+            <a:extLst>
+              <a:ext uri="{FF2B5EF4-FFF2-40B4-BE49-F238E27FC236}">
+                <a16:creationId xmlns:a16="http://schemas.microsoft.com/office/drawing/2014/main" id="{3D99F4A2-D106-6542-8938-C94122399C40}"/>
+              </a:ext>
+            </a:extLst>
+          </p:cNvPr>
+          <p:cNvPicPr>
+            <a:picLocks noGrp="1" noChangeAspect="1"/>
+          </p:cNvPicPr>
+          <p:nvPr>
+            <p:ph idx="1"/>
+          </p:nvPr>
+        </p:nvPicPr>
+        <p:blipFill>
+          <a:blip r:embed="rId5"/>
+          <a:stretch>
+            <a:fillRect/>
+          </a:stretch>
+        </p:blipFill>
+        <p:spPr>
+          <a:xfrm>
+            <a:off x="6306202" y="1605507"/>
+            <a:ext cx="4921842" cy="4398285"/>
+          </a:xfrm>
+          <a:prstGeom prst="roundRect">
+            <a:avLst>
+              <a:gd name="adj" fmla="val 5301"/>
+            </a:avLst>
+          </a:prstGeom>
+          <a:ln w="82550" cap="sq">
+            <a:solidFill>
+              <a:srgbClr val="EAEAEA"/>
+            </a:solidFill>
+            <a:miter lim="800000"/>
+          </a:ln>
+          <a:effectLst/>
+          <a:scene3d>
+            <a:camera prst="orthographicFront"/>
+            <a:lightRig rig="threePt" dir="t">
+              <a:rot lat="0" lon="0" rev="2700000"/>
+            </a:lightRig>
+          </a:scene3d>
+          <a:sp3d contourW="6350">
+            <a:bevelT h="38100"/>
+            <a:contourClr>
+              <a:srgbClr val="C0C0C0"/>
+            </a:contourClr>
+          </a:sp3d>
+        </p:spPr>
+      </p:pic>
+      <p:pic>
+        <p:nvPicPr>
+          <p:cNvPr id="43" name="Picture 42">
+            <a:extLst>
+              <a:ext uri="{FF2B5EF4-FFF2-40B4-BE49-F238E27FC236}">
+                <a16:creationId xmlns:a16="http://schemas.microsoft.com/office/drawing/2014/main" id="{F0CA11D6-C4F1-476E-8455-2C26DEDE94AB}"/>
+              </a:ext>
+              <a:ext uri="{C183D7F6-B498-43B3-948B-1728B52AA6E4}">
+                <adec:decorative xmlns:adec="http://schemas.microsoft.com/office/drawing/2017/decorative" val="1"/>
+              </a:ext>
+            </a:extLst>
+          </p:cNvPr>
+          <p:cNvPicPr>
+            <a:picLocks noGrp="1" noRot="1" noChangeAspect="1" noMove="1" noResize="1" noEditPoints="1" noAdjustHandles="1" noChangeArrowheads="1" noChangeShapeType="1" noCrop="1"/>
+          </p:cNvPicPr>
+          <p:nvPr>
+            <p:extLst>
+              <p:ext uri="{386F3935-93C4-4BCD-93E2-E3B085C9AB24}">
+                <p16:designElem xmlns:p16="http://schemas.microsoft.com/office/powerpoint/2015/main" val="1"/>
+              </p:ext>
+            </p:extLst>
+          </p:nvPr>
+        </p:nvPicPr>
+        <p:blipFill rotWithShape="1">
+          <a:blip r:embed="rId3">
+            <a:extLst>
+              <a:ext uri="{28A0092B-C50C-407E-A947-70E740481C1C}">
+                <a14:useLocalDpi xmlns:a14="http://schemas.microsoft.com/office/drawing/2010/main" val="0"/>
+              </a:ext>
+            </a:extLst>
+          </a:blip>
+          <a:srcRect b="55478"/>
+          <a:stretch/>
+        </p:blipFill>
+        <p:spPr>
+          <a:xfrm>
+            <a:off x="-2607" y="0"/>
+            <a:ext cx="12192000" cy="3053351"/>
+          </a:xfrm>
+          <a:prstGeom prst="rect">
+            <a:avLst/>
+          </a:prstGeom>
+        </p:spPr>
+      </p:pic>
+      <p:pic>
+        <p:nvPicPr>
+          <p:cNvPr id="45" name="Picture 44">
+            <a:extLst>
+              <a:ext uri="{FF2B5EF4-FFF2-40B4-BE49-F238E27FC236}">
+                <a16:creationId xmlns:a16="http://schemas.microsoft.com/office/drawing/2014/main" id="{90717727-6E80-4D56-AF23-9E0AE1D5ADC1}"/>
+              </a:ext>
+              <a:ext uri="{C183D7F6-B498-43B3-948B-1728B52AA6E4}">
+                <adec:decorative xmlns:adec="http://schemas.microsoft.com/office/drawing/2017/decorative" val="1"/>
+              </a:ext>
+            </a:extLst>
+          </p:cNvPr>
+          <p:cNvPicPr>
+            <a:picLocks noGrp="1" noRot="1" noChangeAspect="1" noMove="1" noResize="1" noEditPoints="1" noAdjustHandles="1" noChangeArrowheads="1" noChangeShapeType="1" noCrop="1"/>
+          </p:cNvPicPr>
+          <p:nvPr>
+            <p:extLst>
+              <p:ext uri="{386F3935-93C4-4BCD-93E2-E3B085C9AB24}">
+                <p16:designElem xmlns:p16="http://schemas.microsoft.com/office/powerpoint/2015/main" val="1"/>
+              </p:ext>
+            </p:extLst>
+          </p:nvPr>
+        </p:nvPicPr>
+        <p:blipFill rotWithShape="1">
+          <a:blip r:embed="rId3">
+            <a:extLst>
+              <a:ext uri="{28A0092B-C50C-407E-A947-70E740481C1C}">
+                <a14:useLocalDpi xmlns:a14="http://schemas.microsoft.com/office/drawing/2010/main" val="0"/>
+              </a:ext>
+            </a:extLst>
+          </a:blip>
+          <a:srcRect l="69764" t="46543"/>
+          <a:stretch/>
+        </p:blipFill>
+        <p:spPr>
+          <a:xfrm>
+            <a:off x="8500434" y="3191932"/>
+            <a:ext cx="3686351" cy="3666067"/>
+          </a:xfrm>
+          <a:prstGeom prst="rect">
+            <a:avLst/>
+          </a:prstGeom>
+        </p:spPr>
+      </p:pic>
+      <p:sp>
+        <p:nvSpPr>
+          <p:cNvPr id="2" name="Title 1">
+            <a:extLst>
+              <a:ext uri="{FF2B5EF4-FFF2-40B4-BE49-F238E27FC236}">
                 <a16:creationId xmlns:a16="http://schemas.microsoft.com/office/drawing/2014/main" id="{8BDD8D9E-C320-1F41-88BC-EF3B6E2170BB}"/>
               </a:ext>
             </a:extLst>
@@ -7596,45 +8416,22 @@
             <p:ph type="title"/>
           </p:nvPr>
         </p:nvSpPr>
-        <p:spPr/>
-        <p:txBody>
-          <a:bodyPr/>
-          <a:lstStyle/>
-          <a:p>
-            <a:pPr algn="ctr"/>
-            <a:r>
-              <a:rPr lang="en-US" dirty="0"/>
-              <a:t>New Cases vs </a:t>
-            </a:r>
-            <a:r>
-              <a:rPr lang="en-US"/>
-              <a:t>Face Covering</a:t>
-            </a:r>
-          </a:p>
-        </p:txBody>
-      </p:sp>
-      <p:sp>
-        <p:nvSpPr>
-          <p:cNvPr id="3" name="Content Placeholder 2">
-            <a:extLst>
-              <a:ext uri="{FF2B5EF4-FFF2-40B4-BE49-F238E27FC236}">
-                <a16:creationId xmlns:a16="http://schemas.microsoft.com/office/drawing/2014/main" id="{4E60A561-984D-BE40-A73C-BA9C2CDA312B}"/>
-              </a:ext>
-            </a:extLst>
-          </p:cNvPr>
-          <p:cNvSpPr>
-            <a:spLocks noGrp="1"/>
-          </p:cNvSpPr>
-          <p:nvPr>
-            <p:ph idx="1"/>
-          </p:nvPr>
-        </p:nvSpPr>
-        <p:spPr/>
-        <p:txBody>
-          <a:bodyPr/>
-          <a:lstStyle/>
-          <a:p>
-            <a:endParaRPr lang="en-US"/>
+        <p:spPr>
+          <a:xfrm>
+            <a:off x="635210" y="182522"/>
+            <a:ext cx="10916365" cy="1137554"/>
+          </a:xfrm>
+        </p:spPr>
+        <p:txBody>
+          <a:bodyPr vert="horz" lIns="91440" tIns="45720" rIns="91440" bIns="45720" rtlCol="0" anchor="b">
+            <a:normAutofit/>
+          </a:bodyPr>
+          <a:lstStyle/>
+          <a:p>
+            <a:r>
+              <a:rPr lang="en-US" sz="4800" dirty="0"/>
+              <a:t>New Cases vs Face Covering</a:t>
+            </a:r>
           </a:p>
         </p:txBody>
       </p:sp>
@@ -7651,7 +8448,7 @@
 </p:sld>
 </file>
 
-<file path=ppt/slides/slide13.xml><?xml version="1.0" encoding="utf-8"?>
+<file path=ppt/slides/slide14.xml><?xml version="1.0" encoding="utf-8"?>
 <p:sld xmlns:a="http://schemas.openxmlformats.org/drawingml/2006/main" xmlns:r="http://schemas.openxmlformats.org/officeDocument/2006/relationships" xmlns:p="http://schemas.openxmlformats.org/presentationml/2006/main">
   <p:cSld>
     <p:spTree>
@@ -7673,6 +8470,98 @@
           <p:cNvPr id="2" name="Title 1">
             <a:extLst>
               <a:ext uri="{FF2B5EF4-FFF2-40B4-BE49-F238E27FC236}">
+                <a16:creationId xmlns:a16="http://schemas.microsoft.com/office/drawing/2014/main" id="{35EB39F0-40FA-0D42-9B57-DE4E7C339A5D}"/>
+              </a:ext>
+            </a:extLst>
+          </p:cNvPr>
+          <p:cNvSpPr>
+            <a:spLocks noGrp="1"/>
+          </p:cNvSpPr>
+          <p:nvPr>
+            <p:ph type="title"/>
+          </p:nvPr>
+        </p:nvSpPr>
+        <p:spPr/>
+        <p:txBody>
+          <a:bodyPr/>
+          <a:lstStyle/>
+          <a:p>
+            <a:r>
+              <a:rPr lang="en-US" dirty="0"/>
+              <a:t>Face mask policy effects on covid spread</a:t>
+            </a:r>
+          </a:p>
+        </p:txBody>
+      </p:sp>
+      <p:sp>
+        <p:nvSpPr>
+          <p:cNvPr id="3" name="Content Placeholder 2">
+            <a:extLst>
+              <a:ext uri="{FF2B5EF4-FFF2-40B4-BE49-F238E27FC236}">
+                <a16:creationId xmlns:a16="http://schemas.microsoft.com/office/drawing/2014/main" id="{14B0BA2E-152D-0F4C-8470-FD60E7D2E859}"/>
+              </a:ext>
+            </a:extLst>
+          </p:cNvPr>
+          <p:cNvSpPr>
+            <a:spLocks noGrp="1"/>
+          </p:cNvSpPr>
+          <p:nvPr>
+            <p:ph idx="1"/>
+          </p:nvPr>
+        </p:nvSpPr>
+        <p:spPr/>
+        <p:txBody>
+          <a:bodyPr/>
+          <a:lstStyle/>
+          <a:p>
+            <a:r>
+              <a:rPr lang="en-US" dirty="0"/>
+              <a:t>As covid started spreading the emphasis on face covering was mandatory in given countries.</a:t>
+            </a:r>
+          </a:p>
+          <a:p>
+            <a:r>
+              <a:rPr lang="en-US" dirty="0"/>
+              <a:t>Face covering doesn’t seem to have a direct impact on covid, it still is a protective measure.</a:t>
+            </a:r>
+          </a:p>
+        </p:txBody>
+      </p:sp>
+    </p:spTree>
+    <p:extLst>
+      <p:ext uri="{BB962C8B-B14F-4D97-AF65-F5344CB8AC3E}">
+        <p14:creationId xmlns:p14="http://schemas.microsoft.com/office/powerpoint/2010/main" val="2587332919"/>
+      </p:ext>
+    </p:extLst>
+  </p:cSld>
+  <p:clrMapOvr>
+    <a:masterClrMapping/>
+  </p:clrMapOvr>
+</p:sld>
+</file>
+
+<file path=ppt/slides/slide15.xml><?xml version="1.0" encoding="utf-8"?>
+<p:sld xmlns:a="http://schemas.openxmlformats.org/drawingml/2006/main" xmlns:r="http://schemas.openxmlformats.org/officeDocument/2006/relationships" xmlns:p="http://schemas.openxmlformats.org/presentationml/2006/main">
+  <p:cSld>
+    <p:spTree>
+      <p:nvGrpSpPr>
+        <p:cNvPr id="1" name=""/>
+        <p:cNvGrpSpPr/>
+        <p:nvPr/>
+      </p:nvGrpSpPr>
+      <p:grpSpPr>
+        <a:xfrm>
+          <a:off x="0" y="0"/>
+          <a:ext cx="0" cy="0"/>
+          <a:chOff x="0" y="0"/>
+          <a:chExt cx="0" cy="0"/>
+        </a:xfrm>
+      </p:grpSpPr>
+      <p:sp>
+        <p:nvSpPr>
+          <p:cNvPr id="2" name="Title 1">
+            <a:extLst>
+              <a:ext uri="{FF2B5EF4-FFF2-40B4-BE49-F238E27FC236}">
                 <a16:creationId xmlns:a16="http://schemas.microsoft.com/office/drawing/2014/main" id="{892AC3F2-2C51-D145-9786-8A0D0438B81B}"/>
               </a:ext>
             </a:extLst>
@@ -7717,6 +8606,32 @@
           <a:bodyPr/>
           <a:lstStyle/>
           <a:p>
+            <a:r>
+              <a:rPr lang="en-US" dirty="0"/>
+              <a:t>For all the comparison data the values were categorical. </a:t>
+            </a:r>
+          </a:p>
+          <a:p>
+            <a:r>
+              <a:rPr lang="en-US" dirty="0"/>
+              <a:t>To draw a direct comparison and effect was hard.</a:t>
+            </a:r>
+          </a:p>
+          <a:p>
+            <a:endParaRPr lang="en-US" dirty="0"/>
+          </a:p>
+          <a:p>
+            <a:endParaRPr lang="en-US" dirty="0"/>
+          </a:p>
+          <a:p>
+            <a:r>
+              <a:rPr lang="en-US" dirty="0"/>
+              <a:t>All </a:t>
+            </a:r>
+            <a:r>
+              <a:rPr lang="en-US"/>
+              <a:t>questions welcome. </a:t>
+            </a:r>
             <a:endParaRPr lang="en-US" dirty="0"/>
           </a:p>
         </p:txBody>
@@ -7817,18 +8732,21 @@
             <a:endParaRPr lang="en-US" dirty="0"/>
           </a:p>
           <a:p>
+            <a:pPr algn="just"/>
             <a:r>
               <a:rPr lang="en-US" dirty="0"/>
               <a:t>For our project we decided to work on the current “hot” topic in the world - COVID -19.</a:t>
             </a:r>
           </a:p>
           <a:p>
+            <a:pPr algn="just"/>
             <a:r>
               <a:rPr lang="en-US" dirty="0"/>
               <a:t>As much as covid is the hot topic, we didn’t want to give the standard graphs of the infected cases, death rates etc. Instead, we explored other areas related to Covid and how it has impacted our day to day lives.</a:t>
             </a:r>
           </a:p>
           <a:p>
+            <a:pPr algn="just"/>
             <a:r>
               <a:rPr lang="en-US" dirty="0"/>
               <a:t>Hence, we concluded that we would do the analysis on the new policy changes introduced in the countries because of Covid and how the new policy changes has made any impact on total and new covid cases.</a:t>
@@ -8442,38 +9360,8 @@
         </p:blipFill>
         <p:spPr>
           <a:xfrm>
-            <a:off x="-1058240" y="412961"/>
-            <a:ext cx="10905066" cy="5712545"/>
-          </a:xfrm>
-          <a:prstGeom prst="rect">
-            <a:avLst/>
-          </a:prstGeom>
-        </p:spPr>
-      </p:pic>
-      <p:pic>
-        <p:nvPicPr>
-          <p:cNvPr id="4" name="Picture 3">
-            <a:extLst>
-              <a:ext uri="{FF2B5EF4-FFF2-40B4-BE49-F238E27FC236}">
-                <a16:creationId xmlns:a16="http://schemas.microsoft.com/office/drawing/2014/main" id="{D596ACDE-5F65-B144-ACCB-68FA6FB41653}"/>
-              </a:ext>
-            </a:extLst>
-          </p:cNvPr>
-          <p:cNvPicPr>
-            <a:picLocks noChangeAspect="1"/>
-          </p:cNvPicPr>
-          <p:nvPr/>
-        </p:nvPicPr>
-        <p:blipFill>
-          <a:blip r:embed="rId3"/>
-          <a:stretch>
-            <a:fillRect/>
-          </a:stretch>
-        </p:blipFill>
-        <p:spPr>
-          <a:xfrm>
-            <a:off x="8786435" y="1068512"/>
-            <a:ext cx="3244603" cy="3913351"/>
+            <a:off x="-159052" y="793356"/>
+            <a:ext cx="11707585" cy="5742910"/>
           </a:xfrm>
           <a:prstGeom prst="rect">
             <a:avLst/>
@@ -8494,7 +9382,7 @@
         </p:nvSpPr>
         <p:spPr>
           <a:xfrm>
-            <a:off x="8825500" y="5054885"/>
+            <a:off x="2064053" y="2668712"/>
             <a:ext cx="3205537" cy="760288"/>
           </a:xfrm>
           <a:prstGeom prst="rect">
@@ -8869,8 +9757,8 @@
         </p:blipFill>
         <p:spPr>
           <a:xfrm>
-            <a:off x="4219033" y="3429000"/>
-            <a:ext cx="3749040" cy="3383279"/>
+            <a:off x="4073822" y="3429000"/>
+            <a:ext cx="3894251" cy="3383279"/>
           </a:xfrm>
           <a:prstGeom prst="rect">
             <a:avLst/>
@@ -8931,6 +9819,51 @@
         <p:txBody>
           <a:bodyPr wrap="none" rtlCol="0">
             <a:spAutoFit/>
+          </a:bodyPr>
+          <a:lstStyle/>
+          <a:p>
+            <a:endParaRPr lang="en-US"/>
+          </a:p>
+        </p:txBody>
+      </p:sp>
+      <p:sp>
+        <p:nvSpPr>
+          <p:cNvPr id="2" name="AutoShape 2">
+            <a:extLst>
+              <a:ext uri="{FF2B5EF4-FFF2-40B4-BE49-F238E27FC236}">
+                <a16:creationId xmlns:a16="http://schemas.microsoft.com/office/drawing/2014/main" id="{9A867FB8-0357-AB4E-9945-9C36BEB95218}"/>
+              </a:ext>
+            </a:extLst>
+          </p:cNvPr>
+          <p:cNvSpPr>
+            <a:spLocks noChangeAspect="1" noChangeArrowheads="1"/>
+          </p:cNvSpPr>
+          <p:nvPr/>
+        </p:nvSpPr>
+        <p:spPr bwMode="auto">
+          <a:xfrm>
+            <a:off x="5943600" y="3276600"/>
+            <a:ext cx="304800" cy="304800"/>
+          </a:xfrm>
+          <a:prstGeom prst="rect">
+            <a:avLst/>
+          </a:prstGeom>
+          <a:noFill/>
+          <a:extLst>
+            <a:ext uri="{909E8E84-426E-40DD-AFC4-6F175D3DCCD1}">
+              <a14:hiddenFill xmlns:a14="http://schemas.microsoft.com/office/drawing/2010/main">
+                <a:solidFill>
+                  <a:srgbClr val="FFFFFF"/>
+                </a:solidFill>
+              </a14:hiddenFill>
+            </a:ext>
+          </a:extLst>
+        </p:spPr>
+        <p:txBody>
+          <a:bodyPr vert="horz" wrap="square" lIns="91440" tIns="45720" rIns="91440" bIns="45720" numCol="1" anchor="t" anchorCtr="0" compatLnSpc="1">
+            <a:prstTxWarp prst="textNoShape">
+              <a:avLst/>
+            </a:prstTxWarp>
           </a:bodyPr>
           <a:lstStyle/>
           <a:p>

</xml_diff>